<commit_message>
Clarify QRcodes in notes of Munich slides
Signed-off-by: Weber (US), Matthew L <matthew.l.weber3@boeing.com>
</commit_message>
<xml_diff>
--- a/presentations/2025-11-ELISA-Workshop-Munich-Industry-Safety-Level-vs-Use-Cases.pptx
+++ b/presentations/2025-11-ELISA-Workshop-Munich-Industry-Safety-Level-vs-Use-Cases.pptx
@@ -1554,6 +1554,14 @@
               </a:spcAft>
               <a:buNone/>
             </a:pPr>
+            <a:r>
+              <a:rPr lang="en-US" dirty="0" err="1"/>
+              <a:t>Qrcode</a:t>
+            </a:r>
+            <a:r>
+              <a:rPr lang="en-US" dirty="0"/>
+              <a:t> takes you to the use case discussions page for enter more and upvote where you’re interested</a:t>
+            </a:r>
             <a:endParaRPr dirty="0"/>
           </a:p>
         </p:txBody>
@@ -1704,7 +1712,25 @@
           <a:bodyPr/>
           <a:lstStyle/>
           <a:p>
-            <a:endParaRPr lang="en-US" dirty="0"/>
+            <a:pPr marL="158750" indent="0">
+              <a:buNone/>
+            </a:pPr>
+            <a:r>
+              <a:rPr lang="en-US" dirty="0" err="1"/>
+              <a:t>QRCode</a:t>
+            </a:r>
+            <a:r>
+              <a:rPr lang="en-US" dirty="0"/>
+              <a:t> has links to the Ogma overview which includes a link to the NASA </a:t>
+            </a:r>
+            <a:r>
+              <a:rPr lang="en-US" dirty="0" err="1"/>
+              <a:t>cFS</a:t>
+            </a:r>
+            <a:r>
+              <a:rPr lang="en-US" dirty="0"/>
+              <a:t> site</a:t>
+            </a:r>
           </a:p>
         </p:txBody>
       </p:sp>
@@ -2580,6 +2606,31 @@
               <a:buNone/>
             </a:pPr>
             <a:r>
+              <a:rPr lang="en-US" dirty="0" err="1"/>
+              <a:t>QRCode</a:t>
+            </a:r>
+            <a:r>
+              <a:rPr lang="en-US" dirty="0"/>
+              <a:t> links to the full pdf of this diagram with supporting lifecycle details</a:t>
+            </a:r>
+          </a:p>
+          <a:p>
+            <a:pPr marL="0" indent="0">
+              <a:spcAft>
+                <a:spcPts val="800"/>
+              </a:spcAft>
+              <a:buNone/>
+            </a:pPr>
+            <a:endParaRPr lang="en-US" dirty="0"/>
+          </a:p>
+          <a:p>
+            <a:pPr marL="0" indent="0">
+              <a:spcAft>
+                <a:spcPts val="800"/>
+              </a:spcAft>
+              <a:buNone/>
+            </a:pPr>
+            <a:r>
               <a:rPr lang="en-US" dirty="0"/>
               <a:t>partitioning - “technique for providing isolation between software components to contain and/or isolate faults and potentially reduce the effort of the software verification process” == freedom of interference</a:t>
             </a:r>
@@ -3051,6 +3102,14 @@
               </a:spcAft>
               <a:buNone/>
             </a:pPr>
+            <a:r>
+              <a:rPr lang="en-US" dirty="0" err="1"/>
+              <a:t>Qrcode</a:t>
+            </a:r>
+            <a:r>
+              <a:rPr lang="en-US" dirty="0"/>
+              <a:t> takes you to this Wikipedia tables source</a:t>
+            </a:r>
             <a:endParaRPr dirty="0"/>
           </a:p>
         </p:txBody>
@@ -12144,7 +12203,7 @@
         </p:blipFill>
         <p:spPr>
           <a:xfrm>
-            <a:off x="7507035" y="4152276"/>
+            <a:off x="8041045" y="4280927"/>
             <a:ext cx="697502" cy="697502"/>
           </a:xfrm>
           <a:prstGeom prst="rect">
@@ -14695,8 +14754,8 @@
         </p:blipFill>
         <p:spPr>
           <a:xfrm>
-            <a:off x="8338955" y="4653305"/>
-            <a:ext cx="448877" cy="448877"/>
+            <a:off x="8221579" y="4535929"/>
+            <a:ext cx="566253" cy="566253"/>
           </a:xfrm>
           <a:prstGeom prst="rect">
             <a:avLst/>
@@ -14840,7 +14899,7 @@
           <p:nvPr>
             <p:extLst>
               <p:ext uri="{D42A27DB-BD31-4B8C-83A1-F6EECF244321}">
-                <p14:modId xmlns:p14="http://schemas.microsoft.com/office/powerpoint/2010/main" val="936867666"/>
+                <p14:modId xmlns:p14="http://schemas.microsoft.com/office/powerpoint/2010/main" val="2192737490"/>
               </p:ext>
             </p:extLst>
           </p:nvPr>
@@ -14863,14 +14922,14 @@
                     </a:ext>
                   </a:extLst>
                 </a:gridCol>
-                <a:gridCol w="1784195">
+                <a:gridCol w="1785117">
                   <a:extLst>
                     <a:ext uri="{9D8B030D-6E8A-4147-A177-3AD203B41FA5}">
                       <a16:colId xmlns:a16="http://schemas.microsoft.com/office/drawing/2014/main" val="3798540297"/>
                     </a:ext>
                   </a:extLst>
                 </a:gridCol>
-                <a:gridCol w="3664767">
+                <a:gridCol w="3663845">
                   <a:extLst>
                     <a:ext uri="{9D8B030D-6E8A-4147-A177-3AD203B41FA5}">
                       <a16:colId xmlns:a16="http://schemas.microsoft.com/office/drawing/2014/main" val="1339397661"/>

</xml_diff>